<commit_message>
fin update of docs, theme and more
</commit_message>
<xml_diff>
--- a/Docs/ПЗТЗ/Презентация.pptx
+++ b/Docs/ПЗТЗ/Презентация.pptx
@@ -209,7 +209,7 @@
           <a:p>
             <a:fld id="{6CDEBA07-E1FE-4753-AE33-74AD1A4C5DC7}" type="datetimeFigureOut">
               <a:rPr lang="ru-RU" smtClean="0"/>
-              <a:t>02.06.2023</a:t>
+              <a:t>14.06.2023</a:t>
             </a:fld>
             <a:endParaRPr lang="ru-RU"/>
           </a:p>
@@ -1188,11 +1188,61 @@
           <a:p>
             <a:r>
               <a:rPr lang="ru-RU" dirty="0" smtClean="0"/>
-              <a:t>Спросить</a:t>
-            </a:r>
+              <a:t>План:</a:t>
+            </a:r>
+          </a:p>
+          <a:p>
+            <a:pPr marL="228600" indent="-228600">
+              <a:buAutoNum type="arabicParenR"/>
+            </a:pPr>
             <a:r>
               <a:rPr lang="ru-RU" baseline="0" dirty="0" smtClean="0"/>
-              <a:t> можно ли сесть на демонстрацию</a:t>
+              <a:t>Главная страница</a:t>
+            </a:r>
+          </a:p>
+          <a:p>
+            <a:pPr marL="228600" indent="-228600">
+              <a:buAutoNum type="arabicParenR"/>
+            </a:pPr>
+            <a:r>
+              <a:rPr lang="ru-RU" baseline="0" dirty="0" smtClean="0"/>
+              <a:t>Профиль игрока (себя), наглядно показать профиль </a:t>
+            </a:r>
+            <a:r>
+              <a:rPr lang="ru-RU" baseline="0" smtClean="0"/>
+              <a:t>и ранги</a:t>
+            </a:r>
+            <a:endParaRPr lang="ru-RU" baseline="0" dirty="0" smtClean="0"/>
+          </a:p>
+          <a:p>
+            <a:pPr marL="228600" indent="-228600">
+              <a:buAutoNum type="arabicParenR"/>
+            </a:pPr>
+            <a:r>
+              <a:rPr lang="ru-RU" dirty="0" smtClean="0"/>
+              <a:t>Панель администрации</a:t>
+            </a:r>
+          </a:p>
+          <a:p>
+            <a:pPr marL="228600" indent="-228600">
+              <a:buAutoNum type="arabicParenR"/>
+            </a:pPr>
+            <a:r>
+              <a:rPr lang="ru-RU" dirty="0" smtClean="0"/>
+              <a:t>Изменение статуса</a:t>
+            </a:r>
+            <a:r>
+              <a:rPr lang="ru-RU" baseline="0" dirty="0" smtClean="0"/>
+              <a:t> игры</a:t>
+            </a:r>
+          </a:p>
+          <a:p>
+            <a:pPr marL="228600" indent="-228600">
+              <a:buAutoNum type="arabicParenR"/>
+            </a:pPr>
+            <a:r>
+              <a:rPr lang="ru-RU" baseline="0" dirty="0" smtClean="0"/>
+              <a:t>Профиль игрока (нового), чтобы показать наглядно изменение опыта</a:t>
             </a:r>
             <a:endParaRPr lang="ru-RU" dirty="0"/>
           </a:p>
@@ -1527,7 +1577,7 @@
           <a:p>
             <a:fld id="{3593FF37-4B63-4243-B4AC-05FF218ABABF}" type="datetime1">
               <a:rPr lang="en-US" smtClean="0"/>
-              <a:t>6/2/2023</a:t>
+              <a:t>6/14/2023</a:t>
             </a:fld>
             <a:endParaRPr lang="en-US" dirty="0"/>
           </a:p>
@@ -1809,7 +1859,7 @@
           <a:p>
             <a:fld id="{DB56301B-207E-476E-A992-3E66A96059DA}" type="datetime1">
               <a:rPr lang="en-US" smtClean="0"/>
-              <a:t>6/2/2023</a:t>
+              <a:t>6/14/2023</a:t>
             </a:fld>
             <a:endParaRPr lang="en-US" dirty="0"/>
           </a:p>
@@ -1996,7 +2046,7 @@
           <a:p>
             <a:fld id="{AA71BC96-E4A4-4DE3-BBC0-07F95B821E86}" type="datetime1">
               <a:rPr lang="en-US" smtClean="0"/>
-              <a:t>6/2/2023</a:t>
+              <a:t>6/14/2023</a:t>
             </a:fld>
             <a:endParaRPr lang="en-US" dirty="0"/>
           </a:p>
@@ -2252,7 +2302,7 @@
           <a:p>
             <a:fld id="{ECA499CF-946F-4A3F-A9C0-668430C029AB}" type="datetime1">
               <a:rPr lang="en-US" smtClean="0"/>
-              <a:t>6/2/2023</a:t>
+              <a:t>6/14/2023</a:t>
             </a:fld>
             <a:endParaRPr lang="en-US" dirty="0"/>
           </a:p>
@@ -2671,7 +2721,7 @@
           <a:p>
             <a:fld id="{0EC0441B-0226-4BCA-B346-BBC8C1D1E32A}" type="datetime1">
               <a:rPr lang="en-US" smtClean="0"/>
-              <a:t>6/2/2023</a:t>
+              <a:t>6/14/2023</a:t>
             </a:fld>
             <a:endParaRPr lang="en-US" dirty="0"/>
           </a:p>
@@ -3212,7 +3262,7 @@
           <a:p>
             <a:fld id="{F60DD9C9-DEA0-41D5-AE4C-272BC02D40AF}" type="datetime1">
               <a:rPr lang="en-US" smtClean="0"/>
-              <a:t>6/2/2023</a:t>
+              <a:t>6/14/2023</a:t>
             </a:fld>
             <a:endParaRPr lang="en-US" dirty="0"/>
           </a:p>
@@ -4047,7 +4097,7 @@
           <a:p>
             <a:fld id="{22090343-EC71-457A-9797-E5F7AEE9E2B6}" type="datetime1">
               <a:rPr lang="en-US" smtClean="0"/>
-              <a:t>6/2/2023</a:t>
+              <a:t>6/14/2023</a:t>
             </a:fld>
             <a:endParaRPr lang="en-US" dirty="0"/>
           </a:p>
@@ -4212,7 +4262,7 @@
           <a:p>
             <a:fld id="{2C1CD0AC-9AF1-41F8-882A-3E8832098431}" type="datetime1">
               <a:rPr lang="en-US" smtClean="0"/>
-              <a:t>6/2/2023</a:t>
+              <a:t>6/14/2023</a:t>
             </a:fld>
             <a:endParaRPr lang="en-US" dirty="0"/>
           </a:p>
@@ -4391,7 +4441,7 @@
           <a:p>
             <a:fld id="{27F0B221-0EBD-472C-BAC8-D1FDCA15D751}" type="datetime1">
               <a:rPr lang="en-US" smtClean="0"/>
-              <a:t>6/2/2023</a:t>
+              <a:t>6/14/2023</a:t>
             </a:fld>
             <a:endParaRPr lang="en-US" dirty="0"/>
           </a:p>
@@ -4556,7 +4606,7 @@
           <a:p>
             <a:fld id="{C9DD41A4-95D4-4963-874C-4326E5F2B3DB}" type="datetime1">
               <a:rPr lang="en-US" smtClean="0"/>
-              <a:t>6/2/2023</a:t>
+              <a:t>6/14/2023</a:t>
             </a:fld>
             <a:endParaRPr lang="en-US" dirty="0"/>
           </a:p>
@@ -4799,7 +4849,7 @@
           <a:p>
             <a:fld id="{19D95537-86F4-429E-A95F-EC69186C9D28}" type="datetime1">
               <a:rPr lang="en-US" smtClean="0"/>
-              <a:t>6/2/2023</a:t>
+              <a:t>6/14/2023</a:t>
             </a:fld>
             <a:endParaRPr lang="en-US" dirty="0"/>
           </a:p>
@@ -5031,7 +5081,7 @@
           <a:p>
             <a:fld id="{C806BA75-9CEF-41BA-A1CF-3E7D9632BDA9}" type="datetime1">
               <a:rPr lang="en-US" smtClean="0"/>
-              <a:t>6/2/2023</a:t>
+              <a:t>6/14/2023</a:t>
             </a:fld>
             <a:endParaRPr lang="en-US" dirty="0"/>
           </a:p>
@@ -5399,7 +5449,7 @@
           <a:p>
             <a:fld id="{B90690E0-934C-41E4-92E1-78CF43D3A255}" type="datetime1">
               <a:rPr lang="en-US" smtClean="0"/>
-              <a:t>6/2/2023</a:t>
+              <a:t>6/14/2023</a:t>
             </a:fld>
             <a:endParaRPr lang="en-US" dirty="0"/>
           </a:p>
@@ -5512,7 +5562,7 @@
           <a:p>
             <a:fld id="{BA61E75B-04AC-419B-A0E1-29A96E4BEADE}" type="datetime1">
               <a:rPr lang="en-US" smtClean="0"/>
-              <a:t>6/2/2023</a:t>
+              <a:t>6/14/2023</a:t>
             </a:fld>
             <a:endParaRPr lang="en-US" dirty="0"/>
           </a:p>
@@ -5602,7 +5652,7 @@
           <a:p>
             <a:fld id="{90E82A87-0C28-4915-9C65-1D752A682367}" type="datetime1">
               <a:rPr lang="en-US" smtClean="0"/>
-              <a:t>6/2/2023</a:t>
+              <a:t>6/14/2023</a:t>
             </a:fld>
             <a:endParaRPr lang="en-US" dirty="0"/>
           </a:p>
@@ -5848,7 +5898,7 @@
           <a:p>
             <a:fld id="{48DCAFB8-83B6-4685-B15F-A318C0659CE3}" type="datetime1">
               <a:rPr lang="en-US" smtClean="0"/>
-              <a:t>6/2/2023</a:t>
+              <a:t>6/14/2023</a:t>
             </a:fld>
             <a:endParaRPr lang="en-US" dirty="0"/>
           </a:p>
@@ -6130,7 +6180,7 @@
           <a:p>
             <a:fld id="{B5855704-BBB7-45E4-8A6A-343769325245}" type="datetime1">
               <a:rPr lang="en-US" smtClean="0"/>
-              <a:t>6/2/2023</a:t>
+              <a:t>6/14/2023</a:t>
             </a:fld>
             <a:endParaRPr lang="en-US" dirty="0"/>
           </a:p>
@@ -6338,7 +6388,7 @@
           <a:p>
             <a:fld id="{71F0DCBD-ABB9-4AED-835B-3B651F1E1933}" type="datetime1">
               <a:rPr lang="en-US" smtClean="0"/>
-              <a:t>6/2/2023</a:t>
+              <a:t>6/14/2023</a:t>
             </a:fld>
             <a:endParaRPr lang="en-US" dirty="0"/>
           </a:p>
@@ -7851,7 +7901,12 @@
             <p:ph idx="1"/>
           </p:nvPr>
         </p:nvSpPr>
-        <p:spPr/>
+        <p:spPr>
+          <a:xfrm>
+            <a:off x="281498" y="2062030"/>
+            <a:ext cx="10353762" cy="3695136"/>
+          </a:xfrm>
+        </p:spPr>
         <p:txBody>
           <a:bodyPr>
             <a:normAutofit/>
@@ -7894,7 +7949,12 @@
             <p:ph type="sldNum" sz="quarter" idx="12"/>
           </p:nvPr>
         </p:nvSpPr>
-        <p:spPr/>
+        <p:spPr>
+          <a:xfrm>
+            <a:off x="11267556" y="6233984"/>
+            <a:ext cx="753545" cy="365125"/>
+          </a:xfrm>
+        </p:spPr>
         <p:txBody>
           <a:bodyPr/>
           <a:lstStyle/>
@@ -7907,6 +7967,30 @@
           </a:p>
         </p:txBody>
       </p:sp>
+      <p:pic>
+        <p:nvPicPr>
+          <p:cNvPr id="5" name="Рисунок 4"/>
+          <p:cNvPicPr>
+            <a:picLocks noChangeAspect="1"/>
+          </p:cNvPicPr>
+          <p:nvPr/>
+        </p:nvPicPr>
+        <p:blipFill>
+          <a:blip r:embed="rId2"/>
+          <a:stretch>
+            <a:fillRect/>
+          </a:stretch>
+        </p:blipFill>
+        <p:spPr>
+          <a:xfrm>
+            <a:off x="10479616" y="362035"/>
+            <a:ext cx="901745" cy="6237074"/>
+          </a:xfrm>
+          <a:prstGeom prst="rect">
+            <a:avLst/>
+          </a:prstGeom>
+        </p:spPr>
+      </p:pic>
     </p:spTree>
     <p:extLst>
       <p:ext uri="{BB962C8B-B14F-4D97-AF65-F5344CB8AC3E}">

</xml_diff>